<commit_message>
(unittest): Fix unit test of ApiServer to mock Repository instead of Service
</commit_message>
<xml_diff>
--- a/docs/FoodTruckJunkie-software_architecture_design.pptx
+++ b/docs/FoodTruckJunkie-software_architecture_design.pptx
@@ -282,7 +282,7 @@
           <a:p>
             <a:fld id="{0E5D468B-2538-4A52-BAC6-2C3C54FA3CDA}" type="datetimeFigureOut">
               <a:rPr lang="en-SG" smtClean="0"/>
-              <a:t>23/5/2022</a:t>
+              <a:t>8/6/2022</a:t>
             </a:fld>
             <a:endParaRPr lang="en-SG"/>
           </a:p>
@@ -482,7 +482,7 @@
           <a:p>
             <a:fld id="{0E5D468B-2538-4A52-BAC6-2C3C54FA3CDA}" type="datetimeFigureOut">
               <a:rPr lang="en-SG" smtClean="0"/>
-              <a:t>23/5/2022</a:t>
+              <a:t>8/6/2022</a:t>
             </a:fld>
             <a:endParaRPr lang="en-SG"/>
           </a:p>
@@ -692,7 +692,7 @@
           <a:p>
             <a:fld id="{0E5D468B-2538-4A52-BAC6-2C3C54FA3CDA}" type="datetimeFigureOut">
               <a:rPr lang="en-SG" smtClean="0"/>
-              <a:t>23/5/2022</a:t>
+              <a:t>8/6/2022</a:t>
             </a:fld>
             <a:endParaRPr lang="en-SG"/>
           </a:p>
@@ -892,7 +892,7 @@
           <a:p>
             <a:fld id="{0E5D468B-2538-4A52-BAC6-2C3C54FA3CDA}" type="datetimeFigureOut">
               <a:rPr lang="en-SG" smtClean="0"/>
-              <a:t>23/5/2022</a:t>
+              <a:t>8/6/2022</a:t>
             </a:fld>
             <a:endParaRPr lang="en-SG"/>
           </a:p>
@@ -1168,7 +1168,7 @@
           <a:p>
             <a:fld id="{0E5D468B-2538-4A52-BAC6-2C3C54FA3CDA}" type="datetimeFigureOut">
               <a:rPr lang="en-SG" smtClean="0"/>
-              <a:t>23/5/2022</a:t>
+              <a:t>8/6/2022</a:t>
             </a:fld>
             <a:endParaRPr lang="en-SG"/>
           </a:p>
@@ -1436,7 +1436,7 @@
           <a:p>
             <a:fld id="{0E5D468B-2538-4A52-BAC6-2C3C54FA3CDA}" type="datetimeFigureOut">
               <a:rPr lang="en-SG" smtClean="0"/>
-              <a:t>23/5/2022</a:t>
+              <a:t>8/6/2022</a:t>
             </a:fld>
             <a:endParaRPr lang="en-SG"/>
           </a:p>
@@ -1851,7 +1851,7 @@
           <a:p>
             <a:fld id="{0E5D468B-2538-4A52-BAC6-2C3C54FA3CDA}" type="datetimeFigureOut">
               <a:rPr lang="en-SG" smtClean="0"/>
-              <a:t>23/5/2022</a:t>
+              <a:t>8/6/2022</a:t>
             </a:fld>
             <a:endParaRPr lang="en-SG"/>
           </a:p>
@@ -1993,7 +1993,7 @@
           <a:p>
             <a:fld id="{0E5D468B-2538-4A52-BAC6-2C3C54FA3CDA}" type="datetimeFigureOut">
               <a:rPr lang="en-SG" smtClean="0"/>
-              <a:t>23/5/2022</a:t>
+              <a:t>8/6/2022</a:t>
             </a:fld>
             <a:endParaRPr lang="en-SG"/>
           </a:p>
@@ -2106,7 +2106,7 @@
           <a:p>
             <a:fld id="{0E5D468B-2538-4A52-BAC6-2C3C54FA3CDA}" type="datetimeFigureOut">
               <a:rPr lang="en-SG" smtClean="0"/>
-              <a:t>23/5/2022</a:t>
+              <a:t>8/6/2022</a:t>
             </a:fld>
             <a:endParaRPr lang="en-SG"/>
           </a:p>
@@ -2419,7 +2419,7 @@
           <a:p>
             <a:fld id="{0E5D468B-2538-4A52-BAC6-2C3C54FA3CDA}" type="datetimeFigureOut">
               <a:rPr lang="en-SG" smtClean="0"/>
-              <a:t>23/5/2022</a:t>
+              <a:t>8/6/2022</a:t>
             </a:fld>
             <a:endParaRPr lang="en-SG"/>
           </a:p>
@@ -2708,7 +2708,7 @@
           <a:p>
             <a:fld id="{0E5D468B-2538-4A52-BAC6-2C3C54FA3CDA}" type="datetimeFigureOut">
               <a:rPr lang="en-SG" smtClean="0"/>
-              <a:t>23/5/2022</a:t>
+              <a:t>8/6/2022</a:t>
             </a:fld>
             <a:endParaRPr lang="en-SG"/>
           </a:p>
@@ -2951,7 +2951,7 @@
           <a:p>
             <a:fld id="{0E5D468B-2538-4A52-BAC6-2C3C54FA3CDA}" type="datetimeFigureOut">
               <a:rPr lang="en-SG" smtClean="0"/>
-              <a:t>23/5/2022</a:t>
+              <a:t>8/6/2022</a:t>
             </a:fld>
             <a:endParaRPr lang="en-SG"/>
           </a:p>
@@ -3464,12 +3464,59 @@
           </a:prstGeom>
         </p:spPr>
       </p:pic>
+      <p:pic>
+        <p:nvPicPr>
+          <p:cNvPr id="1026" name="Picture 2">
+            <a:extLst>
+              <a:ext uri="{FF2B5EF4-FFF2-40B4-BE49-F238E27FC236}">
+                <a16:creationId xmlns:a16="http://schemas.microsoft.com/office/drawing/2014/main" id="{1559FD2F-47F4-2AA9-2152-586DABE923E1}"/>
+              </a:ext>
+            </a:extLst>
+          </p:cNvPr>
+          <p:cNvPicPr>
+            <a:picLocks noChangeAspect="1" noChangeArrowheads="1"/>
+          </p:cNvPicPr>
+          <p:nvPr/>
+        </p:nvPicPr>
+        <p:blipFill>
+          <a:blip r:embed="rId3">
+            <a:extLst>
+              <a:ext uri="{28A0092B-C50C-407E-A947-70E740481C1C}">
+                <a14:useLocalDpi xmlns:a14="http://schemas.microsoft.com/office/drawing/2010/main" val="0"/>
+              </a:ext>
+            </a:extLst>
+          </a:blip>
+          <a:srcRect/>
+          <a:stretch>
+            <a:fillRect/>
+          </a:stretch>
+        </p:blipFill>
+        <p:spPr bwMode="auto">
+          <a:xfrm>
+            <a:off x="4347403" y="540106"/>
+            <a:ext cx="884903" cy="884903"/>
+          </a:xfrm>
+          <a:prstGeom prst="rect">
+            <a:avLst/>
+          </a:prstGeom>
+          <a:noFill/>
+          <a:extLst>
+            <a:ext uri="{909E8E84-426E-40DD-AFC4-6F175D3DCCD1}">
+              <a14:hiddenFill xmlns:a14="http://schemas.microsoft.com/office/drawing/2010/main">
+                <a:solidFill>
+                  <a:srgbClr val="FFFFFF"/>
+                </a:solidFill>
+              </a14:hiddenFill>
+            </a:ext>
+          </a:extLst>
+        </p:spPr>
+      </p:pic>
       <p:grpSp>
         <p:nvGrpSpPr>
-          <p:cNvPr id="44" name="Group 43">
-            <a:extLst>
-              <a:ext uri="{FF2B5EF4-FFF2-40B4-BE49-F238E27FC236}">
-                <a16:creationId xmlns:a16="http://schemas.microsoft.com/office/drawing/2014/main" id="{EB9183B9-67F2-61F3-D081-3C03244C6E50}"/>
+          <p:cNvPr id="22" name="Group 21">
+            <a:extLst>
+              <a:ext uri="{FF2B5EF4-FFF2-40B4-BE49-F238E27FC236}">
+                <a16:creationId xmlns:a16="http://schemas.microsoft.com/office/drawing/2014/main" id="{3CCA3035-44D8-5452-0526-49FDBC172455}"/>
               </a:ext>
             </a:extLst>
           </p:cNvPr>
@@ -3478,246 +3525,178 @@
         </p:nvGrpSpPr>
         <p:grpSpPr>
           <a:xfrm>
-            <a:off x="4388138" y="623687"/>
-            <a:ext cx="1872592" cy="1690761"/>
-            <a:chOff x="4469575" y="430653"/>
-            <a:chExt cx="1872592" cy="1690761"/>
+            <a:off x="4757623" y="1442820"/>
+            <a:ext cx="1033859" cy="810103"/>
+            <a:chOff x="6171637" y="2511208"/>
+            <a:chExt cx="1033859" cy="810103"/>
           </a:xfrm>
         </p:grpSpPr>
         <p:pic>
           <p:nvPicPr>
-            <p:cNvPr id="1026" name="Picture 2">
+            <p:cNvPr id="20" name="Picture 19" descr="A picture containing text, monitor, screen, screenshot&#10;&#10;Description automatically generated">
               <a:extLst>
                 <a:ext uri="{FF2B5EF4-FFF2-40B4-BE49-F238E27FC236}">
-                  <a16:creationId xmlns:a16="http://schemas.microsoft.com/office/drawing/2014/main" id="{1559FD2F-47F4-2AA9-2152-586DABE923E1}"/>
+                  <a16:creationId xmlns:a16="http://schemas.microsoft.com/office/drawing/2014/main" id="{93143089-2FCD-4BA1-7CE7-CB3390C9803B}"/>
                 </a:ext>
               </a:extLst>
             </p:cNvPr>
             <p:cNvPicPr>
-              <a:picLocks noChangeAspect="1" noChangeArrowheads="1"/>
+              <a:picLocks noChangeAspect="1"/>
             </p:cNvPicPr>
             <p:nvPr/>
           </p:nvPicPr>
           <p:blipFill>
-            <a:blip r:embed="rId3">
+            <a:blip r:embed="rId4">
               <a:extLst>
                 <a:ext uri="{28A0092B-C50C-407E-A947-70E740481C1C}">
                   <a14:useLocalDpi xmlns:a14="http://schemas.microsoft.com/office/drawing/2010/main" val="0"/>
                 </a:ext>
               </a:extLst>
             </a:blip>
-            <a:srcRect/>
             <a:stretch>
               <a:fillRect/>
             </a:stretch>
           </p:blipFill>
-          <p:spPr bwMode="auto">
+          <p:spPr>
             <a:xfrm>
-              <a:off x="4484001" y="430653"/>
-              <a:ext cx="884903" cy="884903"/>
+              <a:off x="6304226" y="2511208"/>
+              <a:ext cx="657230" cy="538166"/>
+            </a:xfrm>
+            <a:prstGeom prst="rect">
+              <a:avLst/>
+            </a:prstGeom>
+          </p:spPr>
+        </p:pic>
+        <p:sp>
+          <p:nvSpPr>
+            <p:cNvPr id="23" name="TextBox 22">
+              <a:extLst>
+                <a:ext uri="{FF2B5EF4-FFF2-40B4-BE49-F238E27FC236}">
+                  <a16:creationId xmlns:a16="http://schemas.microsoft.com/office/drawing/2014/main" id="{B7BB8A12-43AE-FF75-21F7-50AA782E9C09}"/>
+                </a:ext>
+              </a:extLst>
+            </p:cNvPr>
+            <p:cNvSpPr txBox="1"/>
+            <p:nvPr/>
+          </p:nvSpPr>
+          <p:spPr>
+            <a:xfrm>
+              <a:off x="6171637" y="2951979"/>
+              <a:ext cx="1033859" cy="369332"/>
             </a:xfrm>
             <a:prstGeom prst="rect">
               <a:avLst/>
             </a:prstGeom>
             <a:noFill/>
-            <a:extLst>
-              <a:ext uri="{909E8E84-426E-40DD-AFC4-6F175D3DCCD1}">
-                <a14:hiddenFill xmlns:a14="http://schemas.microsoft.com/office/drawing/2010/main">
-                  <a:solidFill>
-                    <a:srgbClr val="FFFFFF"/>
-                  </a:solidFill>
-                </a14:hiddenFill>
-              </a:ext>
-            </a:extLst>
           </p:spPr>
-        </p:pic>
-        <p:grpSp>
-          <p:nvGrpSpPr>
-            <p:cNvPr id="22" name="Group 21">
+          <p:txBody>
+            <a:bodyPr wrap="square">
+              <a:spAutoFit/>
+            </a:bodyPr>
+            <a:lstStyle/>
+            <a:p>
+              <a:r>
+                <a:rPr lang="en-US" dirty="0"/>
+                <a:t>browser</a:t>
+              </a:r>
+              <a:endParaRPr lang="en-SG" dirty="0"/>
+            </a:p>
+          </p:txBody>
+        </p:sp>
+      </p:grpSp>
+      <p:grpSp>
+        <p:nvGrpSpPr>
+          <p:cNvPr id="33" name="Group 32">
+            <a:extLst>
+              <a:ext uri="{FF2B5EF4-FFF2-40B4-BE49-F238E27FC236}">
+                <a16:creationId xmlns:a16="http://schemas.microsoft.com/office/drawing/2014/main" id="{6C6DA98E-C5B6-0D92-19E4-14871F271A12}"/>
+              </a:ext>
+            </a:extLst>
+          </p:cNvPr>
+          <p:cNvGrpSpPr/>
+          <p:nvPr/>
+        </p:nvGrpSpPr>
+        <p:grpSpPr>
+          <a:xfrm>
+            <a:off x="5393184" y="1112223"/>
+            <a:ext cx="811703" cy="783157"/>
+            <a:chOff x="3499147" y="1047750"/>
+            <a:chExt cx="1186031" cy="1019663"/>
+          </a:xfrm>
+        </p:grpSpPr>
+        <p:pic>
+          <p:nvPicPr>
+            <p:cNvPr id="30" name="Picture 29" descr="Shape&#10;&#10;Description automatically generated">
               <a:extLst>
                 <a:ext uri="{FF2B5EF4-FFF2-40B4-BE49-F238E27FC236}">
-                  <a16:creationId xmlns:a16="http://schemas.microsoft.com/office/drawing/2014/main" id="{3CCA3035-44D8-5452-0526-49FDBC172455}"/>
+                  <a16:creationId xmlns:a16="http://schemas.microsoft.com/office/drawing/2014/main" id="{665A1898-2871-4450-8119-545029853678}"/>
                 </a:ext>
               </a:extLst>
             </p:cNvPr>
-            <p:cNvGrpSpPr/>
+            <p:cNvPicPr>
+              <a:picLocks noChangeAspect="1"/>
+            </p:cNvPicPr>
             <p:nvPr/>
-          </p:nvGrpSpPr>
-          <p:grpSpPr>
+          </p:nvPicPr>
+          <p:blipFill>
+            <a:blip r:embed="rId5">
+              <a:extLst>
+                <a:ext uri="{28A0092B-C50C-407E-A947-70E740481C1C}">
+                  <a14:useLocalDpi xmlns:a14="http://schemas.microsoft.com/office/drawing/2010/main" val="0"/>
+                </a:ext>
+              </a:extLst>
+            </a:blip>
+            <a:stretch>
+              <a:fillRect/>
+            </a:stretch>
+          </p:blipFill>
+          <p:spPr>
             <a:xfrm>
-              <a:off x="4469575" y="1311311"/>
-              <a:ext cx="1033859" cy="810103"/>
-              <a:chOff x="6171637" y="2511208"/>
-              <a:chExt cx="1033859" cy="810103"/>
+              <a:off x="3714750" y="1047750"/>
+              <a:ext cx="777904" cy="777904"/>
             </a:xfrm>
-          </p:grpSpPr>
-          <p:pic>
-            <p:nvPicPr>
-              <p:cNvPr id="20" name="Picture 19" descr="A picture containing text, monitor, screen, screenshot&#10;&#10;Description automatically generated">
-                <a:extLst>
-                  <a:ext uri="{FF2B5EF4-FFF2-40B4-BE49-F238E27FC236}">
-                    <a16:creationId xmlns:a16="http://schemas.microsoft.com/office/drawing/2014/main" id="{93143089-2FCD-4BA1-7CE7-CB3390C9803B}"/>
-                  </a:ext>
-                </a:extLst>
-              </p:cNvPr>
-              <p:cNvPicPr>
-                <a:picLocks noChangeAspect="1"/>
-              </p:cNvPicPr>
-              <p:nvPr/>
-            </p:nvPicPr>
-            <p:blipFill>
-              <a:blip r:embed="rId4">
-                <a:extLst>
-                  <a:ext uri="{28A0092B-C50C-407E-A947-70E740481C1C}">
-                    <a14:useLocalDpi xmlns:a14="http://schemas.microsoft.com/office/drawing/2010/main" val="0"/>
-                  </a:ext>
-                </a:extLst>
-              </a:blip>
-              <a:stretch>
-                <a:fillRect/>
-              </a:stretch>
-            </p:blipFill>
-            <p:spPr>
-              <a:xfrm>
-                <a:off x="6304226" y="2511208"/>
-                <a:ext cx="657230" cy="538166"/>
-              </a:xfrm>
-              <a:prstGeom prst="rect">
-                <a:avLst/>
-              </a:prstGeom>
-            </p:spPr>
-          </p:pic>
-          <p:sp>
-            <p:nvSpPr>
-              <p:cNvPr id="23" name="TextBox 22">
-                <a:extLst>
-                  <a:ext uri="{FF2B5EF4-FFF2-40B4-BE49-F238E27FC236}">
-                    <a16:creationId xmlns:a16="http://schemas.microsoft.com/office/drawing/2014/main" id="{B7BB8A12-43AE-FF75-21F7-50AA782E9C09}"/>
-                  </a:ext>
-                </a:extLst>
-              </p:cNvPr>
-              <p:cNvSpPr txBox="1"/>
-              <p:nvPr/>
-            </p:nvSpPr>
-            <p:spPr>
-              <a:xfrm>
-                <a:off x="6171637" y="2951979"/>
-                <a:ext cx="1033859" cy="369332"/>
-              </a:xfrm>
-              <a:prstGeom prst="rect">
-                <a:avLst/>
-              </a:prstGeom>
-              <a:noFill/>
-            </p:spPr>
-            <p:txBody>
-              <a:bodyPr wrap="square">
-                <a:spAutoFit/>
-              </a:bodyPr>
-              <a:lstStyle/>
-              <a:p>
-                <a:r>
-                  <a:rPr lang="en-US" dirty="0"/>
-                  <a:t>browser</a:t>
-                </a:r>
-                <a:endParaRPr lang="en-SG" dirty="0"/>
-              </a:p>
-            </p:txBody>
-          </p:sp>
-        </p:grpSp>
-        <p:grpSp>
-          <p:nvGrpSpPr>
-            <p:cNvPr id="33" name="Group 32">
+            <a:prstGeom prst="rect">
+              <a:avLst/>
+            </a:prstGeom>
+          </p:spPr>
+        </p:pic>
+        <p:sp>
+          <p:nvSpPr>
+            <p:cNvPr id="31" name="TextBox 30">
               <a:extLst>
                 <a:ext uri="{FF2B5EF4-FFF2-40B4-BE49-F238E27FC236}">
-                  <a16:creationId xmlns:a16="http://schemas.microsoft.com/office/drawing/2014/main" id="{6C6DA98E-C5B6-0D92-19E4-14871F271A12}"/>
+                  <a16:creationId xmlns:a16="http://schemas.microsoft.com/office/drawing/2014/main" id="{1EF86B0F-D9D8-AEFF-0D70-D3CF4BBB9376}"/>
                 </a:ext>
               </a:extLst>
             </p:cNvPr>
-            <p:cNvGrpSpPr/>
+            <p:cNvSpPr txBox="1"/>
             <p:nvPr/>
-          </p:nvGrpSpPr>
-          <p:grpSpPr>
+          </p:nvSpPr>
+          <p:spPr>
             <a:xfrm>
-              <a:off x="5156136" y="885229"/>
-              <a:ext cx="1186031" cy="1019663"/>
-              <a:chOff x="3499147" y="1047750"/>
-              <a:chExt cx="1186031" cy="1019663"/>
+              <a:off x="3499147" y="1744248"/>
+              <a:ext cx="1186031" cy="323165"/>
             </a:xfrm>
-          </p:grpSpPr>
-          <p:pic>
-            <p:nvPicPr>
-              <p:cNvPr id="30" name="Picture 29" descr="Shape&#10;&#10;Description automatically generated">
-                <a:extLst>
-                  <a:ext uri="{FF2B5EF4-FFF2-40B4-BE49-F238E27FC236}">
-                    <a16:creationId xmlns:a16="http://schemas.microsoft.com/office/drawing/2014/main" id="{665A1898-2871-4450-8119-545029853678}"/>
-                  </a:ext>
-                </a:extLst>
-              </p:cNvPr>
-              <p:cNvPicPr>
-                <a:picLocks noChangeAspect="1"/>
-              </p:cNvPicPr>
-              <p:nvPr/>
-            </p:nvPicPr>
-            <p:blipFill>
-              <a:blip r:embed="rId5">
-                <a:extLst>
-                  <a:ext uri="{28A0092B-C50C-407E-A947-70E740481C1C}">
-                    <a14:useLocalDpi xmlns:a14="http://schemas.microsoft.com/office/drawing/2010/main" val="0"/>
-                  </a:ext>
-                </a:extLst>
-              </a:blip>
-              <a:stretch>
-                <a:fillRect/>
-              </a:stretch>
-            </p:blipFill>
-            <p:spPr>
-              <a:xfrm>
-                <a:off x="3714750" y="1047750"/>
-                <a:ext cx="777904" cy="777904"/>
-              </a:xfrm>
-              <a:prstGeom prst="rect">
-                <a:avLst/>
-              </a:prstGeom>
-            </p:spPr>
-          </p:pic>
-          <p:sp>
-            <p:nvSpPr>
-              <p:cNvPr id="31" name="TextBox 30">
-                <a:extLst>
-                  <a:ext uri="{FF2B5EF4-FFF2-40B4-BE49-F238E27FC236}">
-                    <a16:creationId xmlns:a16="http://schemas.microsoft.com/office/drawing/2014/main" id="{1EF86B0F-D9D8-AEFF-0D70-D3CF4BBB9376}"/>
-                  </a:ext>
-                </a:extLst>
-              </p:cNvPr>
-              <p:cNvSpPr txBox="1"/>
-              <p:nvPr/>
-            </p:nvSpPr>
-            <p:spPr>
-              <a:xfrm>
-                <a:off x="3499147" y="1744248"/>
-                <a:ext cx="1186031" cy="323165"/>
-              </a:xfrm>
-              <a:prstGeom prst="rect">
-                <a:avLst/>
-              </a:prstGeom>
-              <a:noFill/>
-            </p:spPr>
-            <p:txBody>
-              <a:bodyPr wrap="square">
-                <a:spAutoFit/>
-              </a:bodyPr>
-              <a:lstStyle/>
-              <a:p>
-                <a:pPr algn="ctr"/>
-                <a:r>
-                  <a:rPr lang="en-US" sz="1500" dirty="0"/>
-                  <a:t>Google Map</a:t>
-                </a:r>
-                <a:endParaRPr lang="en-SG" sz="1500" dirty="0"/>
-              </a:p>
-            </p:txBody>
-          </p:sp>
-        </p:grpSp>
+            <a:prstGeom prst="rect">
+              <a:avLst/>
+            </a:prstGeom>
+            <a:noFill/>
+          </p:spPr>
+          <p:txBody>
+            <a:bodyPr wrap="square">
+              <a:spAutoFit/>
+            </a:bodyPr>
+            <a:lstStyle/>
+            <a:p>
+              <a:pPr algn="ctr"/>
+              <a:r>
+                <a:rPr lang="en-US" sz="1500" dirty="0"/>
+                <a:t>Google Map</a:t>
+              </a:r>
+              <a:endParaRPr lang="en-SG" sz="1500" dirty="0"/>
+            </a:p>
+          </p:txBody>
+        </p:sp>
       </p:grpSp>
       <p:grpSp>
         <p:nvGrpSpPr>
@@ -3830,9 +3809,9 @@
           <p:nvPr/>
         </p:nvCxnSpPr>
         <p:spPr>
-          <a:xfrm>
-            <a:off x="4905068" y="2314448"/>
-            <a:ext cx="4496" cy="746194"/>
+          <a:xfrm flipH="1">
+            <a:off x="4909564" y="2252923"/>
+            <a:ext cx="364989" cy="807719"/>
           </a:xfrm>
           <a:prstGeom prst="straightConnector1">
             <a:avLst/>
@@ -4051,6 +4030,156 @@
             <a:avLst/>
           </a:prstGeom>
           <a:ln w="9525">
+            <a:tailEnd type="triangle"/>
+          </a:ln>
+        </p:spPr>
+        <p:style>
+          <a:lnRef idx="1">
+            <a:schemeClr val="accent1"/>
+          </a:lnRef>
+          <a:fillRef idx="0">
+            <a:schemeClr val="accent1"/>
+          </a:fillRef>
+          <a:effectRef idx="0">
+            <a:schemeClr val="accent1"/>
+          </a:effectRef>
+          <a:fontRef idx="minor">
+            <a:schemeClr val="tx1"/>
+          </a:fontRef>
+        </p:style>
+      </p:cxnSp>
+      <p:grpSp>
+        <p:nvGrpSpPr>
+          <p:cNvPr id="5" name="Group 4">
+            <a:extLst>
+              <a:ext uri="{FF2B5EF4-FFF2-40B4-BE49-F238E27FC236}">
+                <a16:creationId xmlns:a16="http://schemas.microsoft.com/office/drawing/2014/main" id="{4827F3FA-63E8-847F-3CEE-DD13C7EEBB40}"/>
+              </a:ext>
+            </a:extLst>
+          </p:cNvPr>
+          <p:cNvGrpSpPr/>
+          <p:nvPr/>
+        </p:nvGrpSpPr>
+        <p:grpSpPr>
+          <a:xfrm>
+            <a:off x="4206844" y="1504525"/>
+            <a:ext cx="501436" cy="781709"/>
+            <a:chOff x="3628223" y="1569636"/>
+            <a:chExt cx="501436" cy="781709"/>
+          </a:xfrm>
+        </p:grpSpPr>
+        <p:pic>
+          <p:nvPicPr>
+            <p:cNvPr id="1028" name="Picture 4" descr="Cmd Svg Png Icon Free Download (#474043) - OnlineWebFonts.COM">
+              <a:extLst>
+                <a:ext uri="{FF2B5EF4-FFF2-40B4-BE49-F238E27FC236}">
+                  <a16:creationId xmlns:a16="http://schemas.microsoft.com/office/drawing/2014/main" id="{9E0A80D1-F4E5-B1DF-BFC2-560632C9E702}"/>
+                </a:ext>
+              </a:extLst>
+            </p:cNvPr>
+            <p:cNvPicPr>
+              <a:picLocks noChangeAspect="1" noChangeArrowheads="1"/>
+            </p:cNvPicPr>
+            <p:nvPr/>
+          </p:nvPicPr>
+          <p:blipFill>
+            <a:blip r:embed="rId8">
+              <a:extLst>
+                <a:ext uri="{28A0092B-C50C-407E-A947-70E740481C1C}">
+                  <a14:useLocalDpi xmlns:a14="http://schemas.microsoft.com/office/drawing/2010/main" val="0"/>
+                </a:ext>
+              </a:extLst>
+            </a:blip>
+            <a:srcRect/>
+            <a:stretch>
+              <a:fillRect/>
+            </a:stretch>
+          </p:blipFill>
+          <p:spPr bwMode="auto">
+            <a:xfrm>
+              <a:off x="3646587" y="1569636"/>
+              <a:ext cx="471890" cy="472875"/>
+            </a:xfrm>
+            <a:prstGeom prst="rect">
+              <a:avLst/>
+            </a:prstGeom>
+            <a:noFill/>
+            <a:extLst>
+              <a:ext uri="{909E8E84-426E-40DD-AFC4-6F175D3DCCD1}">
+                <a14:hiddenFill xmlns:a14="http://schemas.microsoft.com/office/drawing/2010/main">
+                  <a:solidFill>
+                    <a:srgbClr val="FFFFFF"/>
+                  </a:solidFill>
+                </a14:hiddenFill>
+              </a:ext>
+            </a:extLst>
+          </p:spPr>
+        </p:pic>
+        <p:sp>
+          <p:nvSpPr>
+            <p:cNvPr id="3" name="TextBox 2">
+              <a:extLst>
+                <a:ext uri="{FF2B5EF4-FFF2-40B4-BE49-F238E27FC236}">
+                  <a16:creationId xmlns:a16="http://schemas.microsoft.com/office/drawing/2014/main" id="{93357BFF-EF5A-ABEB-57B1-D58D57F1D703}"/>
+                </a:ext>
+              </a:extLst>
+            </p:cNvPr>
+            <p:cNvSpPr txBox="1"/>
+            <p:nvPr/>
+          </p:nvSpPr>
+          <p:spPr>
+            <a:xfrm>
+              <a:off x="3628223" y="1982013"/>
+              <a:ext cx="501436" cy="369332"/>
+            </a:xfrm>
+            <a:prstGeom prst="rect">
+              <a:avLst/>
+            </a:prstGeom>
+            <a:noFill/>
+          </p:spPr>
+          <p:txBody>
+            <a:bodyPr wrap="square">
+              <a:spAutoFit/>
+            </a:bodyPr>
+            <a:lstStyle/>
+            <a:p>
+              <a:pPr algn="ctr"/>
+              <a:r>
+                <a:rPr lang="en-US" dirty="0" err="1"/>
+                <a:t>Cli</a:t>
+              </a:r>
+              <a:endParaRPr lang="en-SG" dirty="0"/>
+            </a:p>
+          </p:txBody>
+        </p:sp>
+      </p:grpSp>
+      <p:cxnSp>
+        <p:nvCxnSpPr>
+          <p:cNvPr id="7" name="Straight Arrow Connector 6">
+            <a:extLst>
+              <a:ext uri="{FF2B5EF4-FFF2-40B4-BE49-F238E27FC236}">
+                <a16:creationId xmlns:a16="http://schemas.microsoft.com/office/drawing/2014/main" id="{7B3BCFF5-475B-C464-36B5-7216B8B36CB3}"/>
+              </a:ext>
+            </a:extLst>
+          </p:cNvPr>
+          <p:cNvCxnSpPr>
+            <a:stCxn id="3" idx="2"/>
+            <a:endCxn id="10" idx="0"/>
+          </p:cNvCxnSpPr>
+          <p:nvPr/>
+        </p:nvCxnSpPr>
+        <p:spPr>
+          <a:xfrm>
+            <a:off x="4457562" y="2286234"/>
+            <a:ext cx="452002" cy="774408"/>
+          </a:xfrm>
+          <a:prstGeom prst="straightConnector1">
+            <a:avLst/>
+          </a:prstGeom>
+          <a:ln w="9525">
+            <a:solidFill>
+              <a:schemeClr val="tx1"/>
+            </a:solidFill>
             <a:tailEnd type="triangle"/>
           </a:ln>
         </p:spPr>

</xml_diff>